<commit_message>
Added resources into presentation
</commit_message>
<xml_diff>
--- a/Predikcia_bankrotu.pptx
+++ b/Predikcia_bankrotu.pptx
@@ -16,6 +16,7 @@
     <p:sldId id="262" r:id="rId10"/>
     <p:sldId id="263" r:id="rId11"/>
     <p:sldId id="264" r:id="rId12"/>
+    <p:sldId id="267" r:id="rId13"/>
   </p:sldIdLst>
   <p:sldSz cx="12192000" cy="6858000"/>
   <p:notesSz cx="6858000" cy="9144000"/>
@@ -114,6 +115,11 @@
       </a:defRPr>
     </a:lvl9pPr>
   </p:defaultTextStyle>
+  <p:extLst>
+    <p:ext uri="{EFAFB233-063F-42B5-8137-9DF3F51BA10A}">
+      <p15:sldGuideLst xmlns:p15="http://schemas.microsoft.com/office/powerpoint/2012/main"/>
+    </p:ext>
+  </p:extLst>
 </p:presentation>
 </file>
 
@@ -343,7 +349,7 @@
           <a:p>
             <a:fld id="{02AC24A9-CCB6-4F8D-B8DB-C2F3692CFA5A}" type="datetimeFigureOut">
               <a:rPr lang="en-US" smtClean="0"/>
-              <a:t>5/6/2021</a:t>
+              <a:t>5/7/2021</a:t>
             </a:fld>
             <a:endParaRPr lang="en-US" dirty="0"/>
           </a:p>
@@ -551,7 +557,7 @@
           <a:p>
             <a:fld id="{02AC24A9-CCB6-4F8D-B8DB-C2F3692CFA5A}" type="datetimeFigureOut">
               <a:rPr lang="en-US" smtClean="0"/>
-              <a:t>5/6/2021</a:t>
+              <a:t>5/7/2021</a:t>
             </a:fld>
             <a:endParaRPr lang="en-US" dirty="0"/>
           </a:p>
@@ -807,7 +813,7 @@
           <a:p>
             <a:fld id="{02AC24A9-CCB6-4F8D-B8DB-C2F3692CFA5A}" type="datetimeFigureOut">
               <a:rPr lang="en-US" smtClean="0"/>
-              <a:t>5/6/2021</a:t>
+              <a:t>5/7/2021</a:t>
             </a:fld>
             <a:endParaRPr lang="en-US" dirty="0"/>
           </a:p>
@@ -977,7 +983,7 @@
           <a:p>
             <a:fld id="{02AC24A9-CCB6-4F8D-B8DB-C2F3692CFA5A}" type="datetimeFigureOut">
               <a:rPr lang="en-US" smtClean="0"/>
-              <a:t>5/6/2021</a:t>
+              <a:t>5/7/2021</a:t>
             </a:fld>
             <a:endParaRPr lang="en-US" dirty="0"/>
           </a:p>
@@ -1320,7 +1326,7 @@
           <a:p>
             <a:fld id="{02AC24A9-CCB6-4F8D-B8DB-C2F3692CFA5A}" type="datetimeFigureOut">
               <a:rPr lang="en-US" smtClean="0"/>
-              <a:t>5/6/2021</a:t>
+              <a:t>5/7/2021</a:t>
             </a:fld>
             <a:endParaRPr lang="en-US" dirty="0"/>
           </a:p>
@@ -1595,7 +1601,7 @@
           <a:p>
             <a:fld id="{02AC24A9-CCB6-4F8D-B8DB-C2F3692CFA5A}" type="datetimeFigureOut">
               <a:rPr lang="en-US" smtClean="0"/>
-              <a:t>5/6/2021</a:t>
+              <a:t>5/7/2021</a:t>
             </a:fld>
             <a:endParaRPr lang="en-US" dirty="0"/>
           </a:p>
@@ -1974,7 +1980,7 @@
           <a:p>
             <a:fld id="{02AC24A9-CCB6-4F8D-B8DB-C2F3692CFA5A}" type="datetimeFigureOut">
               <a:rPr lang="en-US" smtClean="0"/>
-              <a:t>5/6/2021</a:t>
+              <a:t>5/7/2021</a:t>
             </a:fld>
             <a:endParaRPr lang="en-US" dirty="0"/>
           </a:p>
@@ -2092,7 +2098,7 @@
           <a:p>
             <a:fld id="{02AC24A9-CCB6-4F8D-B8DB-C2F3692CFA5A}" type="datetimeFigureOut">
               <a:rPr lang="en-US" smtClean="0"/>
-              <a:t>5/6/2021</a:t>
+              <a:t>5/7/2021</a:t>
             </a:fld>
             <a:endParaRPr lang="en-US" dirty="0"/>
           </a:p>
@@ -2263,7 +2269,7 @@
           <a:p>
             <a:fld id="{02AC24A9-CCB6-4F8D-B8DB-C2F3692CFA5A}" type="datetimeFigureOut">
               <a:rPr lang="en-US" smtClean="0"/>
-              <a:t>5/6/2021</a:t>
+              <a:t>5/7/2021</a:t>
             </a:fld>
             <a:endParaRPr lang="en-US" dirty="0"/>
           </a:p>
@@ -2617,7 +2623,7 @@
           <a:p>
             <a:fld id="{02AC24A9-CCB6-4F8D-B8DB-C2F3692CFA5A}" type="datetimeFigureOut">
               <a:rPr lang="en-US" smtClean="0"/>
-              <a:t>5/6/2021</a:t>
+              <a:t>5/7/2021</a:t>
             </a:fld>
             <a:endParaRPr lang="en-US" dirty="0"/>
           </a:p>
@@ -2994,7 +3000,7 @@
           <a:p>
             <a:fld id="{02AC24A9-CCB6-4F8D-B8DB-C2F3692CFA5A}" type="datetimeFigureOut">
               <a:rPr lang="en-US" smtClean="0"/>
-              <a:t>5/6/2021</a:t>
+              <a:t>5/7/2021</a:t>
             </a:fld>
             <a:endParaRPr lang="en-US" dirty="0"/>
           </a:p>
@@ -3281,7 +3287,7 @@
           <a:p>
             <a:fld id="{02AC24A9-CCB6-4F8D-B8DB-C2F3692CFA5A}" type="datetimeFigureOut">
               <a:rPr lang="en-US" smtClean="0"/>
-              <a:t>5/6/2021</a:t>
+              <a:t>5/7/2021</a:t>
             </a:fld>
             <a:endParaRPr lang="en-US" dirty="0"/>
           </a:p>
@@ -4381,6 +4387,306 @@
 </p:sld>
 </file>
 
+<file path=ppt/slides/slide12.xml><?xml version="1.0" encoding="utf-8"?>
+<p:sld xmlns:a="http://schemas.openxmlformats.org/drawingml/2006/main" xmlns:r="http://schemas.openxmlformats.org/officeDocument/2006/relationships" xmlns:p="http://schemas.openxmlformats.org/presentationml/2006/main">
+  <p:cSld>
+    <p:spTree>
+      <p:nvGrpSpPr>
+        <p:cNvPr id="1" name=""/>
+        <p:cNvGrpSpPr/>
+        <p:nvPr/>
+      </p:nvGrpSpPr>
+      <p:grpSpPr>
+        <a:xfrm>
+          <a:off x="0" y="0"/>
+          <a:ext cx="0" cy="0"/>
+          <a:chOff x="0" y="0"/>
+          <a:chExt cx="0" cy="0"/>
+        </a:xfrm>
+      </p:grpSpPr>
+      <p:sp>
+        <p:nvSpPr>
+          <p:cNvPr id="2" name="Nadpis 1">
+            <a:extLst>
+              <a:ext uri="{FF2B5EF4-FFF2-40B4-BE49-F238E27FC236}">
+                <a16:creationId xmlns:a16="http://schemas.microsoft.com/office/drawing/2014/main" id="{791E4D5E-67A7-48A4-8F66-412909F1DA64}"/>
+              </a:ext>
+            </a:extLst>
+          </p:cNvPr>
+          <p:cNvSpPr>
+            <a:spLocks noGrp="1"/>
+          </p:cNvSpPr>
+          <p:nvPr>
+            <p:ph type="title"/>
+          </p:nvPr>
+        </p:nvSpPr>
+        <p:spPr/>
+        <p:txBody>
+          <a:bodyPr/>
+          <a:lstStyle/>
+          <a:p>
+            <a:r>
+              <a:rPr lang="sk-SK" dirty="0"/>
+              <a:t>Zdroje</a:t>
+            </a:r>
+          </a:p>
+        </p:txBody>
+      </p:sp>
+      <p:sp>
+        <p:nvSpPr>
+          <p:cNvPr id="3" name="Zástupný objekt pre obsah 2">
+            <a:extLst>
+              <a:ext uri="{FF2B5EF4-FFF2-40B4-BE49-F238E27FC236}">
+                <a16:creationId xmlns:a16="http://schemas.microsoft.com/office/drawing/2014/main" id="{3CA7F99E-D3C2-4E6E-9FAC-9D24F1357237}"/>
+              </a:ext>
+            </a:extLst>
+          </p:cNvPr>
+          <p:cNvSpPr>
+            <a:spLocks noGrp="1"/>
+          </p:cNvSpPr>
+          <p:nvPr>
+            <p:ph idx="1"/>
+          </p:nvPr>
+        </p:nvSpPr>
+        <p:spPr/>
+        <p:txBody>
+          <a:bodyPr/>
+          <a:lstStyle/>
+          <a:p>
+            <a:r>
+              <a:rPr lang="sk-SK" dirty="0"/>
+              <a:t>KERAS.IO. 2020. The Model </a:t>
+            </a:r>
+            <a:r>
+              <a:rPr lang="sk-SK" dirty="0" err="1"/>
+              <a:t>class</a:t>
+            </a:r>
+            <a:r>
+              <a:rPr lang="en-US" dirty="0"/>
+              <a:t> </a:t>
+            </a:r>
+            <a:r>
+              <a:rPr lang="sk-SK" dirty="0"/>
+              <a:t>[online]. 2020. [cit-2021-05-06]. Dostupné na     </a:t>
+            </a:r>
+            <a:r>
+              <a:rPr lang="en-US" dirty="0"/>
+              <a:t>	</a:t>
+            </a:r>
+            <a:r>
+              <a:rPr lang="sk-SK" dirty="0"/>
+              <a:t>internete: </a:t>
+            </a:r>
+            <a:r>
+              <a:rPr lang="sk-SK" dirty="0">
+                <a:hlinkClick r:id="rId2"/>
+              </a:rPr>
+              <a:t>https://keras.io/api/models/model/</a:t>
+            </a:r>
+            <a:endParaRPr lang="en-US" dirty="0"/>
+          </a:p>
+          <a:p>
+            <a:r>
+              <a:rPr lang="en-US" dirty="0"/>
+              <a:t>KAGGLE</a:t>
+            </a:r>
+            <a:r>
+              <a:rPr lang="sk-SK" dirty="0"/>
+              <a:t>.</a:t>
+            </a:r>
+            <a:r>
+              <a:rPr lang="en-US" dirty="0"/>
+              <a:t>COM</a:t>
+            </a:r>
+            <a:r>
+              <a:rPr lang="sk-SK" dirty="0"/>
+              <a:t>. 2020. </a:t>
+            </a:r>
+            <a:r>
+              <a:rPr lang="sk-SK" dirty="0" err="1"/>
+              <a:t>Company</a:t>
+            </a:r>
+            <a:r>
+              <a:rPr lang="sk-SK" dirty="0"/>
+              <a:t> </a:t>
+            </a:r>
+            <a:r>
+              <a:rPr lang="sk-SK" dirty="0" err="1"/>
+              <a:t>Bankruptcy</a:t>
+            </a:r>
+            <a:r>
+              <a:rPr lang="sk-SK" dirty="0"/>
+              <a:t> </a:t>
+            </a:r>
+            <a:r>
+              <a:rPr lang="sk-SK" dirty="0" err="1"/>
+              <a:t>Prediction</a:t>
+            </a:r>
+            <a:r>
+              <a:rPr lang="en-US" dirty="0"/>
+              <a:t> </a:t>
+            </a:r>
+            <a:r>
+              <a:rPr lang="sk-SK" dirty="0"/>
+              <a:t>[online]. 2020. [cit-2021-05-0</a:t>
+            </a:r>
+            <a:r>
+              <a:rPr lang="en-US" dirty="0"/>
+              <a:t>6</a:t>
+            </a:r>
+            <a:r>
+              <a:rPr lang="sk-SK" dirty="0"/>
+              <a:t>]. Dostupné</a:t>
+            </a:r>
+            <a:r>
+              <a:rPr lang="en-US" dirty="0"/>
+              <a:t> 	</a:t>
+            </a:r>
+            <a:r>
+              <a:rPr lang="sk-SK" dirty="0"/>
+              <a:t>na internete: </a:t>
+            </a:r>
+            <a:r>
+              <a:rPr lang="sk-SK" dirty="0">
+                <a:hlinkClick r:id="rId3"/>
+              </a:rPr>
+              <a:t>https://www.kaggle.com/fedesoriano/company-bankruptcy-prediction</a:t>
+            </a:r>
+            <a:endParaRPr lang="en-US" dirty="0"/>
+          </a:p>
+          <a:p>
+            <a:r>
+              <a:rPr lang="en-US" dirty="0"/>
+              <a:t>IMBALANCED-LEARN</a:t>
+            </a:r>
+            <a:r>
+              <a:rPr lang="sk-SK" dirty="0"/>
+              <a:t>.</a:t>
+            </a:r>
+            <a:r>
+              <a:rPr lang="en-US" dirty="0"/>
+              <a:t>ORG</a:t>
+            </a:r>
+            <a:r>
+              <a:rPr lang="sk-SK" dirty="0"/>
+              <a:t>. 2020. Over-</a:t>
+            </a:r>
+            <a:r>
+              <a:rPr lang="sk-SK" dirty="0" err="1"/>
+              <a:t>sampling</a:t>
+            </a:r>
+            <a:r>
+              <a:rPr lang="en-US" dirty="0"/>
+              <a:t> </a:t>
+            </a:r>
+            <a:r>
+              <a:rPr lang="sk-SK" dirty="0"/>
+              <a:t>[online]. 2020. [cit-2021-05-0</a:t>
+            </a:r>
+            <a:r>
+              <a:rPr lang="en-US" dirty="0"/>
+              <a:t>6</a:t>
+            </a:r>
+            <a:r>
+              <a:rPr lang="sk-SK" dirty="0"/>
+              <a:t>]. Dostupné</a:t>
+            </a:r>
+            <a:r>
+              <a:rPr lang="en-US" dirty="0"/>
+              <a:t> 	</a:t>
+            </a:r>
+            <a:r>
+              <a:rPr lang="sk-SK" dirty="0"/>
+              <a:t>na internete: </a:t>
+            </a:r>
+            <a:r>
+              <a:rPr lang="sk-SK" dirty="0">
+                <a:hlinkClick r:id="rId4"/>
+              </a:rPr>
+              <a:t>https://imbalanced-learn.org/stable/over_sampling.html</a:t>
+            </a:r>
+            <a:endParaRPr lang="en-US" dirty="0"/>
+          </a:p>
+          <a:p>
+            <a:r>
+              <a:rPr lang="en-US" dirty="0"/>
+              <a:t>PROGRAMMERSOUGHT.COM. 2020. Activation function sigmoid, tanh, </a:t>
+            </a:r>
+            <a:r>
+              <a:rPr lang="en-US" dirty="0" err="1"/>
+              <a:t>relu</a:t>
+            </a:r>
+            <a:r>
+              <a:rPr lang="en-US" dirty="0"/>
+              <a:t> [online]. 2020. [</a:t>
+            </a:r>
+            <a:r>
+              <a:rPr lang="en-US" dirty="0" err="1"/>
+              <a:t>cit</a:t>
+            </a:r>
+            <a:r>
+              <a:rPr lang="en-US" dirty="0"/>
+              <a:t>-	2021-05-06]. </a:t>
+            </a:r>
+            <a:r>
+              <a:rPr lang="en-US" dirty="0" err="1"/>
+              <a:t>Dostupné</a:t>
+            </a:r>
+            <a:r>
+              <a:rPr lang="en-US" dirty="0"/>
+              <a:t> 	</a:t>
+            </a:r>
+            <a:r>
+              <a:rPr lang="en-US" dirty="0" err="1"/>
+              <a:t>na</a:t>
+            </a:r>
+            <a:r>
+              <a:rPr lang="en-US" dirty="0"/>
+              <a:t> </a:t>
+            </a:r>
+            <a:r>
+              <a:rPr lang="en-US" dirty="0" err="1"/>
+              <a:t>internete</a:t>
+            </a:r>
+            <a:r>
+              <a:rPr lang="en-US" dirty="0"/>
+              <a:t>: 	</a:t>
+            </a:r>
+            <a:r>
+              <a:rPr lang="en-US" dirty="0">
+                <a:hlinkClick r:id="rId5"/>
+              </a:rPr>
+              <a:t>https://www.programmersought.com/article/1060528072/</a:t>
+            </a:r>
+            <a:endParaRPr lang="en-US" dirty="0"/>
+          </a:p>
+          <a:p>
+            <a:endParaRPr lang="en-US" dirty="0"/>
+          </a:p>
+          <a:p>
+            <a:endParaRPr lang="en-US" dirty="0"/>
+          </a:p>
+          <a:p>
+            <a:endParaRPr lang="sk-SK" dirty="0"/>
+          </a:p>
+          <a:p>
+            <a:endParaRPr lang="sk-SK" dirty="0"/>
+          </a:p>
+        </p:txBody>
+      </p:sp>
+    </p:spTree>
+    <p:extLst>
+      <p:ext uri="{BB962C8B-B14F-4D97-AF65-F5344CB8AC3E}">
+        <p14:creationId xmlns:p14="http://schemas.microsoft.com/office/powerpoint/2010/main" val="3558194654"/>
+      </p:ext>
+    </p:extLst>
+  </p:cSld>
+  <p:clrMapOvr>
+    <a:masterClrMapping/>
+  </p:clrMapOvr>
+</p:sld>
+</file>
+
 <file path=ppt/slides/slide2.xml><?xml version="1.0" encoding="utf-8"?>
 <p:sld xmlns:a="http://schemas.openxmlformats.org/drawingml/2006/main" xmlns:r="http://schemas.openxmlformats.org/officeDocument/2006/relationships" xmlns:p="http://schemas.openxmlformats.org/presentationml/2006/main">
   <p:cSld>

</xml_diff>